<commit_message>
Add challenge introduction slides
</commit_message>
<xml_diff>
--- a/2016/content/classification-explorer-navigational-querying-of-statistical-classifications/slideshow.pptx
+++ b/2016/content/classification-explorer-navigational-querying-of-statistical-classifications/slideshow.pptx
@@ -5,10 +5,10 @@
     <p:sldMasterId id="2147483648" r:id="rId1"/>
   </p:sldMasterIdLst>
   <p:notesMasterIdLst>
-    <p:notesMasterId r:id="rId11"/>
+    <p:notesMasterId r:id="rId12"/>
   </p:notesMasterIdLst>
   <p:handoutMasterIdLst>
-    <p:handoutMasterId r:id="rId12"/>
+    <p:handoutMasterId r:id="rId13"/>
   </p:handoutMasterIdLst>
   <p:sldIdLst>
     <p:sldId id="256" r:id="rId2"/>
@@ -19,7 +19,8 @@
     <p:sldId id="308" r:id="rId7"/>
     <p:sldId id="309" r:id="rId8"/>
     <p:sldId id="310" r:id="rId9"/>
-    <p:sldId id="311" r:id="rId10"/>
+    <p:sldId id="312" r:id="rId10"/>
+    <p:sldId id="311" r:id="rId11"/>
   </p:sldIdLst>
   <p:sldSz cx="9144000" cy="6858000" type="screen4x3"/>
   <p:notesSz cx="6797675" cy="9872663"/>
@@ -120,7 +121,7 @@
   </p:defaultTextStyle>
   <p:extLst>
     <p:ext uri="{EFAFB233-063F-42B5-8137-9DF3F51BA10A}">
-      <p15:sldGuideLst xmlns:p15="http://schemas.microsoft.com/office/powerpoint/2012/main" xmlns="">
+      <p15:sldGuideLst xmlns="" xmlns:p15="http://schemas.microsoft.com/office/powerpoint/2012/main">
         <p15:guide id="1" orient="horz" pos="1354">
           <p15:clr>
             <a:srgbClr val="A4A3A4"/>
@@ -226,7 +227,7 @@
             <a:fld id="{7E49FF0A-399B-4939-A1B1-9809D5FC4DD7}" type="datetimeFigureOut">
               <a:rPr lang="it-IT" smtClean="0"/>
               <a:pPr/>
-              <a:t>22/10/2016</a:t>
+              <a:t>02/11/2016</a:t>
             </a:fld>
             <a:endParaRPr lang="it-IT"/>
           </a:p>
@@ -302,7 +303,7 @@
     </p:spTree>
     <p:extLst>
       <p:ext uri="{BB962C8B-B14F-4D97-AF65-F5344CB8AC3E}">
-        <p14:creationId xmlns:p14="http://schemas.microsoft.com/office/powerpoint/2010/main" xmlns="" val="1655504518"/>
+        <p14:creationId xmlns="" xmlns:p14="http://schemas.microsoft.com/office/powerpoint/2010/main" val="1655504518"/>
       </p:ext>
     </p:extLst>
   </p:cSld>
@@ -393,7 +394,7 @@
             <a:fld id="{CDC92C2F-1076-46E4-A327-F22BAF541F0E}" type="datetimeFigureOut">
               <a:rPr lang="it-IT" smtClean="0"/>
               <a:pPr/>
-              <a:t>22/10/2016</a:t>
+              <a:t>02/11/2016</a:t>
             </a:fld>
             <a:endParaRPr lang="it-IT"/>
           </a:p>
@@ -562,7 +563,7 @@
     </p:spTree>
     <p:extLst>
       <p:ext uri="{BB962C8B-B14F-4D97-AF65-F5344CB8AC3E}">
-        <p14:creationId xmlns:p14="http://schemas.microsoft.com/office/powerpoint/2010/main" xmlns="" val="3791533782"/>
+        <p14:creationId xmlns="" xmlns:p14="http://schemas.microsoft.com/office/powerpoint/2010/main" val="3791533782"/>
       </p:ext>
     </p:extLst>
   </p:cSld>
@@ -737,7 +738,7 @@
     </p:spTree>
     <p:extLst>
       <p:ext uri="{BB962C8B-B14F-4D97-AF65-F5344CB8AC3E}">
-        <p14:creationId xmlns:p14="http://schemas.microsoft.com/office/powerpoint/2010/main" xmlns="" val="2363343929"/>
+        <p14:creationId xmlns="" xmlns:p14="http://schemas.microsoft.com/office/powerpoint/2010/main" val="2363343929"/>
       </p:ext>
     </p:extLst>
   </p:cSld>
@@ -822,7 +823,7 @@
     </p:spTree>
     <p:extLst>
       <p:ext uri="{BB962C8B-B14F-4D97-AF65-F5344CB8AC3E}">
-        <p14:creationId xmlns:p14="http://schemas.microsoft.com/office/powerpoint/2010/main" xmlns="" val="1753691056"/>
+        <p14:creationId xmlns="" xmlns:p14="http://schemas.microsoft.com/office/powerpoint/2010/main" val="1753691056"/>
       </p:ext>
     </p:extLst>
   </p:cSld>
@@ -1095,7 +1096,7 @@
     </p:spTree>
     <p:extLst>
       <p:ext uri="{BB962C8B-B14F-4D97-AF65-F5344CB8AC3E}">
-        <p14:creationId xmlns:p14="http://schemas.microsoft.com/office/powerpoint/2010/main" xmlns="" val="3188729197"/>
+        <p14:creationId xmlns="" xmlns:p14="http://schemas.microsoft.com/office/powerpoint/2010/main" val="3188729197"/>
       </p:ext>
     </p:extLst>
   </p:cSld>
@@ -1313,7 +1314,7 @@
     </p:spTree>
     <p:extLst>
       <p:ext uri="{BB962C8B-B14F-4D97-AF65-F5344CB8AC3E}">
-        <p14:creationId xmlns:p14="http://schemas.microsoft.com/office/powerpoint/2010/main" xmlns="" val="2663530267"/>
+        <p14:creationId xmlns="" xmlns:p14="http://schemas.microsoft.com/office/powerpoint/2010/main" val="2663530267"/>
       </p:ext>
     </p:extLst>
   </p:cSld>
@@ -1524,7 +1525,7 @@
     </p:spTree>
     <p:extLst>
       <p:ext uri="{BB962C8B-B14F-4D97-AF65-F5344CB8AC3E}">
-        <p14:creationId xmlns:p14="http://schemas.microsoft.com/office/powerpoint/2010/main" xmlns="" val="2544814152"/>
+        <p14:creationId xmlns="" xmlns:p14="http://schemas.microsoft.com/office/powerpoint/2010/main" val="2544814152"/>
       </p:ext>
     </p:extLst>
   </p:cSld>
@@ -1768,7 +1769,7 @@
     </p:spTree>
     <p:extLst>
       <p:ext uri="{BB962C8B-B14F-4D97-AF65-F5344CB8AC3E}">
-        <p14:creationId xmlns:p14="http://schemas.microsoft.com/office/powerpoint/2010/main" xmlns="" val="405287103"/>
+        <p14:creationId xmlns="" xmlns:p14="http://schemas.microsoft.com/office/powerpoint/2010/main" val="405287103"/>
       </p:ext>
     </p:extLst>
   </p:cSld>
@@ -2052,7 +2053,7 @@
     </p:spTree>
     <p:extLst>
       <p:ext uri="{BB962C8B-B14F-4D97-AF65-F5344CB8AC3E}">
-        <p14:creationId xmlns:p14="http://schemas.microsoft.com/office/powerpoint/2010/main" xmlns="" val="890210994"/>
+        <p14:creationId xmlns="" xmlns:p14="http://schemas.microsoft.com/office/powerpoint/2010/main" val="890210994"/>
       </p:ext>
     </p:extLst>
   </p:cSld>
@@ -2379,7 +2380,7 @@
     </p:spTree>
     <p:extLst>
       <p:ext uri="{BB962C8B-B14F-4D97-AF65-F5344CB8AC3E}">
-        <p14:creationId xmlns:p14="http://schemas.microsoft.com/office/powerpoint/2010/main" xmlns="" val="2542799337"/>
+        <p14:creationId xmlns="" xmlns:p14="http://schemas.microsoft.com/office/powerpoint/2010/main" val="2542799337"/>
       </p:ext>
     </p:extLst>
   </p:cSld>
@@ -2846,7 +2847,7 @@
     </p:spTree>
     <p:extLst>
       <p:ext uri="{BB962C8B-B14F-4D97-AF65-F5344CB8AC3E}">
-        <p14:creationId xmlns:p14="http://schemas.microsoft.com/office/powerpoint/2010/main" xmlns="" val="442874295"/>
+        <p14:creationId xmlns="" xmlns:p14="http://schemas.microsoft.com/office/powerpoint/2010/main" val="442874295"/>
       </p:ext>
     </p:extLst>
   </p:cSld>
@@ -2997,7 +2998,7 @@
     </p:spTree>
     <p:extLst>
       <p:ext uri="{BB962C8B-B14F-4D97-AF65-F5344CB8AC3E}">
-        <p14:creationId xmlns:p14="http://schemas.microsoft.com/office/powerpoint/2010/main" xmlns="" val="3524136905"/>
+        <p14:creationId xmlns="" xmlns:p14="http://schemas.microsoft.com/office/powerpoint/2010/main" val="3524136905"/>
       </p:ext>
     </p:extLst>
   </p:cSld>
@@ -3125,7 +3126,7 @@
     </p:spTree>
     <p:extLst>
       <p:ext uri="{BB962C8B-B14F-4D97-AF65-F5344CB8AC3E}">
-        <p14:creationId xmlns:p14="http://schemas.microsoft.com/office/powerpoint/2010/main" xmlns="" val="1446449659"/>
+        <p14:creationId xmlns="" xmlns:p14="http://schemas.microsoft.com/office/powerpoint/2010/main" val="1446449659"/>
       </p:ext>
     </p:extLst>
   </p:cSld>
@@ -3443,7 +3444,7 @@
     </p:spTree>
     <p:extLst>
       <p:ext uri="{BB962C8B-B14F-4D97-AF65-F5344CB8AC3E}">
-        <p14:creationId xmlns:p14="http://schemas.microsoft.com/office/powerpoint/2010/main" xmlns="" val="4145275377"/>
+        <p14:creationId xmlns="" xmlns:p14="http://schemas.microsoft.com/office/powerpoint/2010/main" val="4145275377"/>
       </p:ext>
     </p:extLst>
   </p:cSld>
@@ -3730,7 +3731,7 @@
     </p:spTree>
     <p:extLst>
       <p:ext uri="{BB962C8B-B14F-4D97-AF65-F5344CB8AC3E}">
-        <p14:creationId xmlns:p14="http://schemas.microsoft.com/office/powerpoint/2010/main" xmlns="" val="1004873191"/>
+        <p14:creationId xmlns="" xmlns:p14="http://schemas.microsoft.com/office/powerpoint/2010/main" val="1004873191"/>
       </p:ext>
     </p:extLst>
   </p:cSld>
@@ -3860,7 +3861,7 @@
           <a:blip r:embed="rId13" cstate="screen">
             <a:extLst>
               <a:ext uri="{28A0092B-C50C-407E-A947-70E740481C1C}">
-                <a14:useLocalDpi xmlns:a14="http://schemas.microsoft.com/office/drawing/2010/main" xmlns=""/>
+                <a14:useLocalDpi xmlns="" xmlns:a14="http://schemas.microsoft.com/office/drawing/2010/main"/>
               </a:ext>
             </a:extLst>
           </a:blip>
@@ -3881,7 +3882,7 @@
     </p:spTree>
     <p:extLst>
       <p:ext uri="{BB962C8B-B14F-4D97-AF65-F5344CB8AC3E}">
-        <p14:creationId xmlns:p14="http://schemas.microsoft.com/office/powerpoint/2010/main" xmlns="" val="2502975623"/>
+        <p14:creationId xmlns="" xmlns:p14="http://schemas.microsoft.com/office/powerpoint/2010/main" val="2502975623"/>
       </p:ext>
     </p:extLst>
   </p:cSld>
@@ -4386,7 +4387,119 @@
     </p:spTree>
     <p:extLst>
       <p:ext uri="{BB962C8B-B14F-4D97-AF65-F5344CB8AC3E}">
-        <p14:creationId xmlns:p14="http://schemas.microsoft.com/office/powerpoint/2010/main" xmlns="" val="449239185"/>
+        <p14:creationId xmlns="" xmlns:p14="http://schemas.microsoft.com/office/powerpoint/2010/main" val="449239185"/>
+      </p:ext>
+    </p:extLst>
+  </p:cSld>
+  <p:clrMapOvr>
+    <a:masterClrMapping/>
+  </p:clrMapOvr>
+  <p:timing>
+    <p:tnLst>
+      <p:par>
+        <p:cTn id="1" dur="indefinite" restart="never" nodeType="tmRoot"/>
+      </p:par>
+    </p:tnLst>
+  </p:timing>
+</p:sld>
+</file>
+
+<file path=ppt/slides/slide10.xml><?xml version="1.0" encoding="utf-8"?>
+<p:sld xmlns:a="http://schemas.openxmlformats.org/drawingml/2006/main" xmlns:r="http://schemas.openxmlformats.org/officeDocument/2006/relationships" xmlns:p="http://schemas.openxmlformats.org/presentationml/2006/main">
+  <p:cSld>
+    <p:spTree>
+      <p:nvGrpSpPr>
+        <p:cNvPr id="1" name=""/>
+        <p:cNvGrpSpPr/>
+        <p:nvPr/>
+      </p:nvGrpSpPr>
+      <p:grpSpPr>
+        <a:xfrm>
+          <a:off x="0" y="0"/>
+          <a:ext cx="0" cy="0"/>
+          <a:chOff x="0" y="0"/>
+          <a:chExt cx="0" cy="0"/>
+        </a:xfrm>
+      </p:grpSpPr>
+      <p:sp>
+        <p:nvSpPr>
+          <p:cNvPr id="2" name="Titolo 1"/>
+          <p:cNvSpPr>
+            <a:spLocks noGrp="1"/>
+          </p:cNvSpPr>
+          <p:nvPr>
+            <p:ph type="title"/>
+          </p:nvPr>
+        </p:nvSpPr>
+        <p:spPr>
+          <a:xfrm>
+            <a:off x="286305" y="2713038"/>
+            <a:ext cx="8229600" cy="1143000"/>
+          </a:xfrm>
+        </p:spPr>
+        <p:txBody>
+          <a:bodyPr/>
+          <a:lstStyle/>
+          <a:p>
+            <a:r>
+              <a:rPr lang="it-IT" dirty="0" smtClean="0"/>
+              <a:t>DEMO</a:t>
+            </a:r>
+            <a:br>
+              <a:rPr lang="it-IT" dirty="0" smtClean="0"/>
+            </a:br>
+            <a:r>
+              <a:rPr lang="it-IT" dirty="0" smtClean="0"/>
+              <a:t> </a:t>
+            </a:r>
+            <a:r>
+              <a:rPr lang="it-IT" dirty="0" smtClean="0">
+                <a:hlinkClick r:id="rId2"/>
+              </a:rPr>
+              <a:t>https://</a:t>
+            </a:r>
+            <a:r>
+              <a:rPr lang="it-IT" dirty="0" smtClean="0">
+                <a:hlinkClick r:id="rId2"/>
+              </a:rPr>
+              <a:t>github.com/UNECE/Classification-Explorer</a:t>
+            </a:r>
+            <a:r>
+              <a:rPr lang="it-IT" dirty="0" smtClean="0"/>
+              <a:t> </a:t>
+            </a:r>
+            <a:endParaRPr lang="it-IT" dirty="0"/>
+          </a:p>
+        </p:txBody>
+      </p:sp>
+      <p:sp>
+        <p:nvSpPr>
+          <p:cNvPr id="5" name="Segnaposto numero diapositiva 4"/>
+          <p:cNvSpPr>
+            <a:spLocks noGrp="1"/>
+          </p:cNvSpPr>
+          <p:nvPr>
+            <p:ph type="sldNum" sz="quarter" idx="12"/>
+          </p:nvPr>
+        </p:nvSpPr>
+        <p:spPr/>
+        <p:txBody>
+          <a:bodyPr/>
+          <a:lstStyle/>
+          <a:p>
+            <a:fld id="{E0C751B5-631A-9242-B635-C18491BE6C62}" type="slidenum">
+              <a:rPr lang="it-IT" smtClean="0"/>
+              <a:pPr/>
+              <a:t>10</a:t>
+            </a:fld>
+            <a:endParaRPr lang="it-IT" dirty="0"/>
+          </a:p>
+        </p:txBody>
+      </p:sp>
+    </p:spTree>
+    <p:extLst>
+      <p:ext uri="{BB962C8B-B14F-4D97-AF65-F5344CB8AC3E}">
+        <p14:creationId xmlns="" xmlns:p14="http://schemas.microsoft.com/office/powerpoint/2010/main" val="2825765998"/>
       </p:ext>
     </p:extLst>
   </p:cSld>
@@ -4656,7 +4769,7 @@
     </p:spTree>
     <p:extLst>
       <p:ext uri="{BB962C8B-B14F-4D97-AF65-F5344CB8AC3E}">
-        <p14:creationId xmlns:p14="http://schemas.microsoft.com/office/powerpoint/2010/main" xmlns="" val="1054677085"/>
+        <p14:creationId xmlns="" xmlns:p14="http://schemas.microsoft.com/office/powerpoint/2010/main" val="1054677085"/>
       </p:ext>
     </p:extLst>
   </p:cSld>
@@ -4877,7 +4990,7 @@
     </p:spTree>
     <p:extLst>
       <p:ext uri="{BB962C8B-B14F-4D97-AF65-F5344CB8AC3E}">
-        <p14:creationId xmlns:p14="http://schemas.microsoft.com/office/powerpoint/2010/main" xmlns="" val="2844036791"/>
+        <p14:creationId xmlns="" xmlns:p14="http://schemas.microsoft.com/office/powerpoint/2010/main" val="2844036791"/>
       </p:ext>
     </p:extLst>
   </p:cSld>
@@ -5090,7 +5203,7 @@
     </p:spTree>
     <p:extLst>
       <p:ext uri="{BB962C8B-B14F-4D97-AF65-F5344CB8AC3E}">
-        <p14:creationId xmlns:p14="http://schemas.microsoft.com/office/powerpoint/2010/main" xmlns="" val="4191105112"/>
+        <p14:creationId xmlns="" xmlns:p14="http://schemas.microsoft.com/office/powerpoint/2010/main" val="4191105112"/>
       </p:ext>
     </p:extLst>
   </p:cSld>
@@ -5366,7 +5479,7 @@
     </p:spTree>
     <p:extLst>
       <p:ext uri="{BB962C8B-B14F-4D97-AF65-F5344CB8AC3E}">
-        <p14:creationId xmlns:p14="http://schemas.microsoft.com/office/powerpoint/2010/main" xmlns="" val="1899882390"/>
+        <p14:creationId xmlns="" xmlns:p14="http://schemas.microsoft.com/office/powerpoint/2010/main" val="1899882390"/>
       </p:ext>
     </p:extLst>
   </p:cSld>
@@ -5851,7 +5964,7 @@
     </p:spTree>
     <p:extLst>
       <p:ext uri="{BB962C8B-B14F-4D97-AF65-F5344CB8AC3E}">
-        <p14:creationId xmlns:p14="http://schemas.microsoft.com/office/powerpoint/2010/main" xmlns="" val="4121226142"/>
+        <p14:creationId xmlns="" xmlns:p14="http://schemas.microsoft.com/office/powerpoint/2010/main" val="4121226142"/>
       </p:ext>
     </p:extLst>
   </p:cSld>
@@ -6027,7 +6140,7 @@
           <a:blip r:embed="rId2">
             <a:extLst>
               <a:ext uri="{28A0092B-C50C-407E-A947-70E740481C1C}">
-                <a14:useLocalDpi xmlns:a14="http://schemas.microsoft.com/office/drawing/2010/main" xmlns="" val="0"/>
+                <a14:useLocalDpi xmlns="" xmlns:a14="http://schemas.microsoft.com/office/drawing/2010/main" val="0"/>
               </a:ext>
             </a:extLst>
           </a:blip>
@@ -6053,7 +6166,7 @@
     </p:spTree>
     <p:extLst>
       <p:ext uri="{BB962C8B-B14F-4D97-AF65-F5344CB8AC3E}">
-        <p14:creationId xmlns:p14="http://schemas.microsoft.com/office/powerpoint/2010/main" xmlns="" val="3578175626"/>
+        <p14:creationId xmlns="" xmlns:p14="http://schemas.microsoft.com/office/powerpoint/2010/main" val="3578175626"/>
       </p:ext>
     </p:extLst>
   </p:cSld>
@@ -6351,7 +6464,7 @@
     </p:spTree>
     <p:extLst>
       <p:ext uri="{BB962C8B-B14F-4D97-AF65-F5344CB8AC3E}">
-        <p14:creationId xmlns:p14="http://schemas.microsoft.com/office/powerpoint/2010/main" xmlns="" val="1013077636"/>
+        <p14:creationId xmlns="" xmlns:p14="http://schemas.microsoft.com/office/powerpoint/2010/main" val="1013077636"/>
       </p:ext>
     </p:extLst>
   </p:cSld>
@@ -6387,73 +6500,524 @@
       </p:grpSpPr>
       <p:sp>
         <p:nvSpPr>
-          <p:cNvPr id="2" name="Titolo 1"/>
-          <p:cNvSpPr>
-            <a:spLocks noGrp="1"/>
-          </p:cNvSpPr>
-          <p:nvPr>
-            <p:ph type="title"/>
-          </p:nvPr>
-        </p:nvSpPr>
-        <p:spPr>
-          <a:xfrm>
-            <a:off x="286305" y="2713038"/>
-            <a:ext cx="8229600" cy="1143000"/>
-          </a:xfrm>
-        </p:spPr>
-        <p:txBody>
-          <a:bodyPr/>
+          <p:cNvPr id="57" name="TextShape 1"/>
+          <p:cNvSpPr txBox="1"/>
+          <p:nvPr/>
+        </p:nvSpPr>
+        <p:spPr>
+          <a:xfrm>
+            <a:off x="457172" y="273352"/>
+            <a:ext cx="8228763" cy="1145009"/>
+          </a:xfrm>
+          <a:prstGeom prst="rect">
+            <a:avLst/>
+          </a:prstGeom>
+          <a:noFill/>
+          <a:ln>
+            <a:noFill/>
+          </a:ln>
+        </p:spPr>
+        <p:txBody>
+          <a:bodyPr lIns="0" tIns="0" rIns="0" bIns="0" anchor="ctr"/>
           <a:lstStyle/>
           <a:p>
-            <a:r>
-              <a:rPr lang="it-IT" dirty="0" smtClean="0"/>
-              <a:t>DEMO</a:t>
-            </a:r>
-            <a:endParaRPr lang="it-IT" dirty="0"/>
-          </a:p>
-        </p:txBody>
-      </p:sp>
-      <p:sp>
-        <p:nvSpPr>
-          <p:cNvPr id="5" name="Segnaposto numero diapositiva 4"/>
-          <p:cNvSpPr>
-            <a:spLocks noGrp="1"/>
-          </p:cNvSpPr>
-          <p:nvPr>
-            <p:ph type="sldNum" sz="quarter" idx="12"/>
-          </p:nvPr>
-        </p:nvSpPr>
-        <p:spPr/>
-        <p:txBody>
-          <a:bodyPr/>
+            <a:pPr algn="ctr"/>
+            <a:r>
+              <a:rPr lang="fr-FR" sz="4000" spc="-1" dirty="0" err="1">
+                <a:solidFill>
+                  <a:srgbClr val="000000"/>
+                </a:solidFill>
+                <a:uFill>
+                  <a:solidFill>
+                    <a:srgbClr val="FFFFFF"/>
+                  </a:solidFill>
+                </a:uFill>
+                <a:latin typeface="Arial"/>
+              </a:rPr>
+              <a:t>Technical</a:t>
+            </a:r>
+            <a:r>
+              <a:rPr lang="fr-FR" sz="4000" spc="-1" dirty="0">
+                <a:solidFill>
+                  <a:srgbClr val="000000"/>
+                </a:solidFill>
+                <a:uFill>
+                  <a:solidFill>
+                    <a:srgbClr val="FFFFFF"/>
+                  </a:solidFill>
+                </a:uFill>
+                <a:latin typeface="Arial"/>
+              </a:rPr>
+              <a:t> architecture</a:t>
+            </a:r>
+          </a:p>
+        </p:txBody>
+      </p:sp>
+      <p:pic>
+        <p:nvPicPr>
+          <p:cNvPr id="58" name="Picture 57"/>
+          <p:cNvPicPr/>
+          <p:nvPr/>
+        </p:nvPicPr>
+        <p:blipFill>
+          <a:blip r:embed="rId2"/>
+          <a:stretch/>
+        </p:blipFill>
+        <p:spPr>
+          <a:xfrm>
+            <a:off x="3846773" y="5356002"/>
+            <a:ext cx="2102990" cy="582302"/>
+          </a:xfrm>
+          <a:prstGeom prst="rect">
+            <a:avLst/>
+          </a:prstGeom>
+          <a:ln>
+            <a:noFill/>
+          </a:ln>
+        </p:spPr>
+      </p:pic>
+      <p:pic>
+        <p:nvPicPr>
+          <p:cNvPr id="59" name="Picture 58"/>
+          <p:cNvPicPr/>
+          <p:nvPr/>
+        </p:nvPicPr>
+        <p:blipFill>
+          <a:blip r:embed="rId3"/>
+          <a:stretch/>
+        </p:blipFill>
+        <p:spPr>
+          <a:xfrm>
+            <a:off x="3983924" y="3657757"/>
+            <a:ext cx="1828687" cy="1203141"/>
+          </a:xfrm>
+          <a:prstGeom prst="rect">
+            <a:avLst/>
+          </a:prstGeom>
+          <a:ln>
+            <a:noFill/>
+          </a:ln>
+        </p:spPr>
+      </p:pic>
+      <p:pic>
+        <p:nvPicPr>
+          <p:cNvPr id="60" name="Picture 59"/>
+          <p:cNvPicPr/>
+          <p:nvPr/>
+        </p:nvPicPr>
+        <p:blipFill>
+          <a:blip r:embed="rId4"/>
+          <a:stretch/>
+        </p:blipFill>
+        <p:spPr>
+          <a:xfrm>
+            <a:off x="4022131" y="6003621"/>
+            <a:ext cx="1752274" cy="473549"/>
+          </a:xfrm>
+          <a:prstGeom prst="rect">
+            <a:avLst/>
+          </a:prstGeom>
+          <a:ln>
+            <a:noFill/>
+          </a:ln>
+        </p:spPr>
+      </p:pic>
+      <p:pic>
+        <p:nvPicPr>
+          <p:cNvPr id="61" name="Picture 60"/>
+          <p:cNvPicPr/>
+          <p:nvPr/>
+        </p:nvPicPr>
+        <p:blipFill>
+          <a:blip r:embed="rId5"/>
+          <a:stretch/>
+        </p:blipFill>
+        <p:spPr>
+          <a:xfrm>
+            <a:off x="6988196" y="4049660"/>
+            <a:ext cx="1821502" cy="671133"/>
+          </a:xfrm>
+          <a:prstGeom prst="rect">
+            <a:avLst/>
+          </a:prstGeom>
+          <a:ln>
+            <a:noFill/>
+          </a:ln>
+        </p:spPr>
+      </p:pic>
+      <p:pic>
+        <p:nvPicPr>
+          <p:cNvPr id="62" name="Picture 61"/>
+          <p:cNvPicPr/>
+          <p:nvPr/>
+        </p:nvPicPr>
+        <p:blipFill>
+          <a:blip r:embed="rId6"/>
+          <a:stretch/>
+        </p:blipFill>
+        <p:spPr>
+          <a:xfrm>
+            <a:off x="391861" y="1503273"/>
+            <a:ext cx="835971" cy="847489"/>
+          </a:xfrm>
+          <a:prstGeom prst="rect">
+            <a:avLst/>
+          </a:prstGeom>
+          <a:ln>
+            <a:noFill/>
+          </a:ln>
+        </p:spPr>
+      </p:pic>
+      <p:pic>
+        <p:nvPicPr>
+          <p:cNvPr id="63" name="Picture 62"/>
+          <p:cNvPicPr/>
+          <p:nvPr/>
+        </p:nvPicPr>
+        <p:blipFill>
+          <a:blip r:embed="rId7"/>
+          <a:stretch/>
+        </p:blipFill>
+        <p:spPr>
+          <a:xfrm>
+            <a:off x="4293821" y="2362519"/>
+            <a:ext cx="1209219" cy="903335"/>
+          </a:xfrm>
+          <a:prstGeom prst="rect">
+            <a:avLst/>
+          </a:prstGeom>
+          <a:ln>
+            <a:noFill/>
+          </a:ln>
+        </p:spPr>
+      </p:pic>
+      <p:pic>
+        <p:nvPicPr>
+          <p:cNvPr id="64" name="Picture 63"/>
+          <p:cNvPicPr/>
+          <p:nvPr/>
+        </p:nvPicPr>
+        <p:blipFill>
+          <a:blip r:embed="rId8"/>
+          <a:stretch/>
+        </p:blipFill>
+        <p:spPr>
+          <a:xfrm>
+            <a:off x="2416479" y="1534952"/>
+            <a:ext cx="783723" cy="783805"/>
+          </a:xfrm>
+          <a:prstGeom prst="rect">
+            <a:avLst/>
+          </a:prstGeom>
+          <a:ln>
+            <a:noFill/>
+          </a:ln>
+        </p:spPr>
+      </p:pic>
+      <p:pic>
+        <p:nvPicPr>
+          <p:cNvPr id="65" name="Picture 64"/>
+          <p:cNvPicPr/>
+          <p:nvPr/>
+        </p:nvPicPr>
+        <p:blipFill>
+          <a:blip r:embed="rId9"/>
+          <a:stretch/>
+        </p:blipFill>
+        <p:spPr>
+          <a:xfrm>
+            <a:off x="3494097" y="1751804"/>
+            <a:ext cx="1828687" cy="350100"/>
+          </a:xfrm>
+          <a:prstGeom prst="rect">
+            <a:avLst/>
+          </a:prstGeom>
+          <a:ln>
+            <a:noFill/>
+          </a:ln>
+        </p:spPr>
+      </p:pic>
+      <p:pic>
+        <p:nvPicPr>
+          <p:cNvPr id="66" name="Picture 65"/>
+          <p:cNvPicPr/>
+          <p:nvPr/>
+        </p:nvPicPr>
+        <p:blipFill>
+          <a:blip r:embed="rId10"/>
+          <a:stretch/>
+        </p:blipFill>
+        <p:spPr>
+          <a:xfrm>
+            <a:off x="5486060" y="1675384"/>
+            <a:ext cx="2033761" cy="503268"/>
+          </a:xfrm>
+          <a:prstGeom prst="rect">
+            <a:avLst/>
+          </a:prstGeom>
+          <a:ln>
+            <a:noFill/>
+          </a:ln>
+        </p:spPr>
+      </p:pic>
+      <p:sp>
+        <p:nvSpPr>
+          <p:cNvPr id="67" name="CustomShape 2"/>
+          <p:cNvSpPr/>
+          <p:nvPr/>
+        </p:nvSpPr>
+        <p:spPr>
+          <a:xfrm>
+            <a:off x="2220548" y="1469635"/>
+            <a:ext cx="5355439" cy="914439"/>
+          </a:xfrm>
+          <a:prstGeom prst="rect">
+            <a:avLst/>
+          </a:prstGeom>
+          <a:noFill/>
+          <a:ln>
+            <a:solidFill>
+              <a:srgbClr val="000000"/>
+            </a:solidFill>
+            <a:custDash/>
+          </a:ln>
+        </p:spPr>
+        <p:style>
+          <a:lnRef idx="0">
+            <a:scrgbClr r="0" g="0" b="0"/>
+          </a:lnRef>
+          <a:fillRef idx="0">
+            <a:scrgbClr r="0" g="0" b="0"/>
+          </a:fillRef>
+          <a:effectRef idx="0">
+            <a:scrgbClr r="0" g="0" b="0"/>
+          </a:effectRef>
+          <a:fontRef idx="minor"/>
+        </p:style>
+      </p:sp>
+      <p:cxnSp>
+        <p:nvCxnSpPr>
+          <p:cNvPr id="68" name="Line 3"/>
+          <p:cNvCxnSpPr>
+            <a:stCxn id="62" idx="3"/>
+          </p:cNvCxnSpPr>
+          <p:nvPr/>
+        </p:nvCxnSpPr>
+        <p:spPr>
+          <a:xfrm>
+            <a:off x="1227833" y="1926854"/>
+            <a:ext cx="993042" cy="327"/>
+          </a:xfrm>
+          <a:prstGeom prst="bentConnector3">
+            <a:avLst/>
+          </a:prstGeom>
+          <a:ln w="10800">
+            <a:solidFill>
+              <a:srgbClr val="000000"/>
+            </a:solidFill>
+            <a:round/>
+            <a:tailEnd type="triangle" w="med" len="med"/>
+          </a:ln>
+        </p:spPr>
+      </p:cxnSp>
+      <p:sp>
+        <p:nvSpPr>
+          <p:cNvPr id="69" name="CustomShape 4"/>
+          <p:cNvSpPr/>
+          <p:nvPr/>
+        </p:nvSpPr>
+        <p:spPr>
+          <a:xfrm>
+            <a:off x="3755339" y="5290684"/>
+            <a:ext cx="2285858" cy="1241025"/>
+          </a:xfrm>
+          <a:prstGeom prst="rect">
+            <a:avLst/>
+          </a:prstGeom>
+          <a:noFill/>
+          <a:ln>
+            <a:solidFill>
+              <a:srgbClr val="000000"/>
+            </a:solidFill>
+            <a:custDash/>
+          </a:ln>
+        </p:spPr>
+        <p:style>
+          <a:lnRef idx="0">
+            <a:scrgbClr r="0" g="0" b="0"/>
+          </a:lnRef>
+          <a:fillRef idx="0">
+            <a:scrgbClr r="0" g="0" b="0"/>
+          </a:fillRef>
+          <a:effectRef idx="0">
+            <a:scrgbClr r="0" g="0" b="0"/>
+          </a:effectRef>
+          <a:fontRef idx="minor"/>
+        </p:style>
+      </p:sp>
+      <p:cxnSp>
+        <p:nvCxnSpPr>
+          <p:cNvPr id="70" name="Line 5"/>
+          <p:cNvCxnSpPr>
+            <a:stCxn id="63" idx="2"/>
+            <a:endCxn id="59" idx="0"/>
+          </p:cNvCxnSpPr>
+          <p:nvPr/>
+        </p:nvCxnSpPr>
+        <p:spPr>
+          <a:xfrm>
+            <a:off x="4898267" y="3265855"/>
+            <a:ext cx="327" cy="392229"/>
+          </a:xfrm>
+          <a:prstGeom prst="bentConnector3">
+            <a:avLst/>
+          </a:prstGeom>
+          <a:ln w="10800">
+            <a:solidFill>
+              <a:srgbClr val="000000"/>
+            </a:solidFill>
+            <a:round/>
+            <a:tailEnd type="triangle" w="med" len="med"/>
+          </a:ln>
+        </p:spPr>
+      </p:cxnSp>
+      <p:cxnSp>
+        <p:nvCxnSpPr>
+          <p:cNvPr id="71" name="Line 6"/>
+          <p:cNvCxnSpPr>
+            <a:stCxn id="59" idx="2"/>
+            <a:endCxn id="69" idx="0"/>
+          </p:cNvCxnSpPr>
+          <p:nvPr/>
+        </p:nvCxnSpPr>
+        <p:spPr>
+          <a:xfrm>
+            <a:off x="4898267" y="4860898"/>
+            <a:ext cx="327" cy="430113"/>
+          </a:xfrm>
+          <a:prstGeom prst="bentConnector3">
+            <a:avLst/>
+          </a:prstGeom>
+          <a:ln w="10800">
+            <a:solidFill>
+              <a:srgbClr val="000000"/>
+            </a:solidFill>
+            <a:round/>
+            <a:headEnd type="triangle" w="med" len="med"/>
+            <a:tailEnd type="triangle" w="med" len="med"/>
+          </a:ln>
+        </p:spPr>
+      </p:cxnSp>
+      <p:sp>
+        <p:nvSpPr>
+          <p:cNvPr id="72" name="TextShape 7"/>
+          <p:cNvSpPr txBox="1"/>
+          <p:nvPr/>
+        </p:nvSpPr>
+        <p:spPr>
+          <a:xfrm>
+            <a:off x="2089928" y="2678001"/>
+            <a:ext cx="1698066" cy="326585"/>
+          </a:xfrm>
+          <a:prstGeom prst="rect">
+            <a:avLst/>
+          </a:prstGeom>
+          <a:noFill/>
+          <a:ln>
+            <a:noFill/>
+          </a:ln>
+        </p:spPr>
+        <p:txBody>
+          <a:bodyPr lIns="81639" tIns="40820" rIns="81639" bIns="40820"/>
           <a:lstStyle/>
           <a:p>
-            <a:fld id="{E0C751B5-631A-9242-B635-C18491BE6C62}" type="slidenum">
-              <a:rPr lang="it-IT" smtClean="0"/>
-              <a:pPr/>
-              <a:t>9</a:t>
-            </a:fld>
-            <a:endParaRPr lang="it-IT" dirty="0"/>
+            <a:r>
+              <a:rPr lang="fr-FR" sz="1600" spc="-1" dirty="0">
+                <a:solidFill>
+                  <a:srgbClr val="000000"/>
+                </a:solidFill>
+                <a:uFill>
+                  <a:solidFill>
+                    <a:srgbClr val="FFFFFF"/>
+                  </a:solidFill>
+                </a:uFill>
+                <a:latin typeface="Arial"/>
+              </a:rPr>
+              <a:t>Data </a:t>
+            </a:r>
+            <a:r>
+              <a:rPr lang="fr-FR" sz="1600" spc="-1" dirty="0" err="1">
+                <a:solidFill>
+                  <a:srgbClr val="000000"/>
+                </a:solidFill>
+                <a:uFill>
+                  <a:solidFill>
+                    <a:srgbClr val="FFFFFF"/>
+                  </a:solidFill>
+                </a:uFill>
+                <a:latin typeface="Arial"/>
+              </a:rPr>
+              <a:t>integration</a:t>
+            </a:r>
+            <a:endParaRPr lang="fr-FR" sz="1600" spc="-1" dirty="0">
+              <a:solidFill>
+                <a:srgbClr val="000000"/>
+              </a:solidFill>
+              <a:uFill>
+                <a:solidFill>
+                  <a:srgbClr val="FFFFFF"/>
+                </a:solidFill>
+              </a:uFill>
+              <a:latin typeface="Arial"/>
+            </a:endParaRPr>
+          </a:p>
+        </p:txBody>
+      </p:sp>
+      <p:sp>
+        <p:nvSpPr>
+          <p:cNvPr id="73" name="TextShape 8"/>
+          <p:cNvSpPr txBox="1"/>
+          <p:nvPr/>
+        </p:nvSpPr>
+        <p:spPr>
+          <a:xfrm>
+            <a:off x="2089927" y="4833465"/>
+            <a:ext cx="1828687" cy="326585"/>
+          </a:xfrm>
+          <a:prstGeom prst="rect">
+            <a:avLst/>
+          </a:prstGeom>
+          <a:noFill/>
+          <a:ln>
+            <a:noFill/>
+          </a:ln>
+        </p:spPr>
+        <p:txBody>
+          <a:bodyPr lIns="81639" tIns="40820" rIns="81639" bIns="40820"/>
+          <a:lstStyle/>
+          <a:p>
+            <a:r>
+              <a:rPr lang="fr-FR" sz="1600" spc="-1" dirty="0">
+                <a:solidFill>
+                  <a:srgbClr val="000000"/>
+                </a:solidFill>
+                <a:uFill>
+                  <a:solidFill>
+                    <a:srgbClr val="FFFFFF"/>
+                  </a:solidFill>
+                </a:uFill>
+                <a:latin typeface="Arial"/>
+              </a:rPr>
+              <a:t>Data exploration</a:t>
+            </a:r>
           </a:p>
         </p:txBody>
       </p:sp>
     </p:spTree>
-    <p:extLst>
-      <p:ext uri="{BB962C8B-B14F-4D97-AF65-F5344CB8AC3E}">
-        <p14:creationId xmlns:p14="http://schemas.microsoft.com/office/powerpoint/2010/main" xmlns="" val="2825765998"/>
-      </p:ext>
-    </p:extLst>
   </p:cSld>
   <p:clrMapOvr>
     <a:masterClrMapping/>
   </p:clrMapOvr>
-  <p:timing>
-    <p:tnLst>
-      <p:par>
-        <p:cTn id="1" dur="indefinite" restart="never" nodeType="tmRoot"/>
-      </p:par>
-    </p:tnLst>
-  </p:timing>
 </p:sld>
 </file>
 

</xml_diff>